<commit_message>
last version ? :-)
</commit_message>
<xml_diff>
--- a/doc/HAtH.pptx
+++ b/doc/HAtH.pptx
@@ -6157,8 +6157,17 @@
             </a:pPr>
             <a:r>
               <a:rPr lang="en-US" sz="1800" b="1" dirty="0" smtClean="0"/>
-              <a:t>Forced Social Isolation raise many type of issue </a:t>
-            </a:r>
+              <a:t>Forced Social Isolation raise many type </a:t>
+            </a:r>
+            <a:r>
+              <a:rPr lang="en-US" sz="1800" b="1" smtClean="0"/>
+              <a:t>of </a:t>
+            </a:r>
+            <a:r>
+              <a:rPr lang="en-US" sz="1800" b="1" smtClean="0"/>
+              <a:t>issues </a:t>
+            </a:r>
+            <a:endParaRPr lang="en-US" sz="1800" b="1" dirty="0" smtClean="0"/>
           </a:p>
           <a:p>
             <a:pPr marL="342900" indent="-342900" algn="l">
@@ -6167,7 +6176,7 @@
             </a:pPr>
             <a:r>
               <a:rPr lang="en-US" sz="1800" b="1" dirty="0" smtClean="0"/>
-              <a:t>Health and Psychological issue</a:t>
+              <a:t>Health and Psychological issues</a:t>
             </a:r>
           </a:p>
           <a:p>
@@ -6177,7 +6186,7 @@
             </a:pPr>
             <a:r>
               <a:rPr lang="en-US" sz="1800" b="1" dirty="0" smtClean="0"/>
-              <a:t>Reduce the social isolation issue and raise health prevention</a:t>
+              <a:t>Reduce the social isolation issues and raise health prevention</a:t>
             </a:r>
           </a:p>
           <a:p>
@@ -6321,11 +6330,7 @@
             </a:r>
             <a:r>
               <a:rPr lang="en-US" sz="1800" b="1" dirty="0" smtClean="0"/>
-              <a:t>, modular </a:t>
-            </a:r>
-            <a:r>
-              <a:rPr lang="en-US" sz="1800" b="1" dirty="0" smtClean="0"/>
-              <a:t>open framework</a:t>
+              <a:t>, modular open framework</a:t>
             </a:r>
           </a:p>
           <a:p>
@@ -6363,15 +6368,7 @@
             </a:pPr>
             <a:r>
               <a:rPr lang="en-US" sz="1800" b="1" dirty="0" smtClean="0"/>
-              <a:t>High customization for </a:t>
-            </a:r>
-            <a:r>
-              <a:rPr lang="en-US" sz="1800" b="1" dirty="0" smtClean="0"/>
-              <a:t>different </a:t>
-            </a:r>
-            <a:r>
-              <a:rPr lang="en-US" sz="1800" b="1" dirty="0" smtClean="0"/>
-              <a:t>needs</a:t>
+              <a:t>High customization for different needs</a:t>
             </a:r>
           </a:p>
           <a:p>
@@ -6712,11 +6709,7 @@
             </a:r>
             <a:r>
               <a:rPr lang="en-US" b="1" dirty="0" smtClean="0"/>
-              <a:t> </a:t>
-            </a:r>
-            <a:r>
-              <a:rPr lang="en-US" b="1" dirty="0" smtClean="0"/>
-              <a:t>data</a:t>
+              <a:t> data</a:t>
             </a:r>
           </a:p>
           <a:p>
@@ -6895,11 +6888,7 @@
             </a:br>
             <a:r>
               <a:rPr lang="it-IT" sz="4800" b="1" dirty="0" smtClean="0"/>
-              <a:t>The complete HAtH </a:t>
-            </a:r>
-            <a:r>
-              <a:rPr lang="it-IT" sz="4800" b="1" dirty="0" smtClean="0"/>
-              <a:t>solution Team</a:t>
+              <a:t>The complete HAtH solution Team</a:t>
             </a:r>
             <a:endParaRPr lang="it-IT" sz="4800" b="1" dirty="0"/>
           </a:p>

</xml_diff>